<commit_message>
added results - no space for problems :(
</commit_message>
<xml_diff>
--- a/präsentation.pptx
+++ b/präsentation.pptx
@@ -195,7 +195,7 @@
           <a:p>
             <a:fld id="{BCDB334D-D17F-49C4-91DD-37BB7E818209}" type="datetimeFigureOut">
               <a:rPr lang="de-CH" smtClean="0"/>
-              <a:t>25.05.2015</a:t>
+              <a:t>26.05.2015</a:t>
             </a:fld>
             <a:endParaRPr lang="de-CH"/>
           </a:p>
@@ -620,7 +620,7 @@
           <a:p>
             <a:fld id="{92BF4FBE-0522-49A2-A01E-13F521B4C0B7}" type="datetime1">
               <a:rPr lang="de-DE" smtClean="0"/>
-              <a:t>25.05.2015</a:t>
+              <a:t>26.05.2015</a:t>
             </a:fld>
             <a:endParaRPr lang="de-DE"/>
           </a:p>
@@ -853,7 +853,7 @@
           <a:p>
             <a:fld id="{681F6098-E9E1-42B4-9C80-2F52B9453439}" type="datetime1">
               <a:rPr lang="de-DE" smtClean="0"/>
-              <a:t>25.05.2015</a:t>
+              <a:t>26.05.2015</a:t>
             </a:fld>
             <a:endParaRPr lang="de-DE"/>
           </a:p>
@@ -1133,7 +1133,7 @@
           <a:p>
             <a:fld id="{0E397BD4-0686-495C-8D8F-54DB8CB790DF}" type="datetime1">
               <a:rPr lang="de-DE" smtClean="0"/>
-              <a:t>25.05.2015</a:t>
+              <a:t>26.05.2015</a:t>
             </a:fld>
             <a:endParaRPr lang="de-DE"/>
           </a:p>
@@ -1450,7 +1450,7 @@
           <a:p>
             <a:fld id="{0E397BD4-0686-495C-8D8F-54DB8CB790DF}" type="datetime1">
               <a:rPr lang="de-DE" smtClean="0"/>
-              <a:t>25.05.2015</a:t>
+              <a:t>26.05.2015</a:t>
             </a:fld>
             <a:endParaRPr lang="de-DE"/>
           </a:p>
@@ -2063,7 +2063,7 @@
           <a:p>
             <a:fld id="{3B2F6CB8-9391-4BED-909F-C47A979AE1C4}" type="datetime1">
               <a:rPr lang="de-DE" smtClean="0"/>
-              <a:t>25.05.2015</a:t>
+              <a:t>26.05.2015</a:t>
             </a:fld>
             <a:endParaRPr lang="de-DE"/>
           </a:p>
@@ -2404,7 +2404,7 @@
           <a:p>
             <a:fld id="{C6A1628A-2A40-4B37-B167-309C0EBB4BBF}" type="datetime1">
               <a:rPr lang="de-DE" smtClean="0"/>
-              <a:t>25.05.2015</a:t>
+              <a:t>26.05.2015</a:t>
             </a:fld>
             <a:endParaRPr lang="de-DE"/>
           </a:p>
@@ -2536,7 +2536,7 @@
           <a:p>
             <a:fld id="{64AE1E89-2EE0-4320-B5A2-F15E505D5862}" type="datetime1">
               <a:rPr lang="de-DE" smtClean="0"/>
-              <a:t>25.05.2015</a:t>
+              <a:t>26.05.2015</a:t>
             </a:fld>
             <a:endParaRPr lang="de-DE"/>
           </a:p>
@@ -2671,7 +2671,7 @@
           <a:p>
             <a:fld id="{7D860B62-60FD-48EF-B2F4-6E7265AD3459}" type="datetime1">
               <a:rPr lang="de-DE" smtClean="0"/>
-              <a:t>25.05.2015</a:t>
+              <a:t>26.05.2015</a:t>
             </a:fld>
             <a:endParaRPr lang="de-DE"/>
           </a:p>
@@ -2822,7 +2822,7 @@
           <a:p>
             <a:fld id="{7F4A91D9-FBFE-4ACC-A99A-BC74A6E03CC5}" type="datetime1">
               <a:rPr lang="de-DE" smtClean="0"/>
-              <a:t>25.05.2015</a:t>
+              <a:t>26.05.2015</a:t>
             </a:fld>
             <a:endParaRPr lang="de-DE"/>
           </a:p>
@@ -3228,7 +3228,7 @@
           <a:p>
             <a:fld id="{BD23B19E-8C35-419D-B8B2-87612A89E43F}" type="datetime1">
               <a:rPr lang="de-DE" smtClean="0"/>
-              <a:t>25.05.2015</a:t>
+              <a:t>26.05.2015</a:t>
             </a:fld>
             <a:endParaRPr lang="de-DE" dirty="0"/>
           </a:p>
@@ -3837,7 +3837,7 @@
           <a:p>
             <a:fld id="{92BF4FBE-0522-49A2-A01E-13F521B4C0B7}" type="datetime1">
               <a:rPr lang="de-DE" smtClean="0"/>
-              <a:t>25.05.2015</a:t>
+              <a:t>26.05.2015</a:t>
             </a:fld>
             <a:endParaRPr lang="de-DE"/>
           </a:p>
@@ -3988,8 +3988,12 @@
           <a:p>
             <a:pPr lvl="1"/>
             <a:r>
+              <a:rPr lang="de-CH" dirty="0" smtClean="0"/>
+              <a:t>Mikrokanonisches </a:t>
+            </a:r>
+            <a:r>
               <a:rPr lang="de-CH" dirty="0"/>
-              <a:t>Kanonisches Ensemble </a:t>
+              <a:t>Ensemble </a:t>
             </a:r>
           </a:p>
           <a:p>
@@ -4012,8 +4016,12 @@
           <a:p>
             <a:pPr lvl="1"/>
             <a:r>
+              <a:rPr lang="de-CH" dirty="0" smtClean="0"/>
+              <a:t>Kanonisches </a:t>
+            </a:r>
+            <a:r>
               <a:rPr lang="de-CH" dirty="0"/>
-              <a:t>Mikrokanonisches Ensemble</a:t>
+              <a:t>Ensemble</a:t>
             </a:r>
           </a:p>
           <a:p>
@@ -4053,7 +4061,7 @@
           <a:p>
             <a:fld id="{0E397BD4-0686-495C-8D8F-54DB8CB790DF}" type="datetime1">
               <a:rPr lang="de-DE" smtClean="0"/>
-              <a:t>25.05.2015</a:t>
+              <a:t>26.05.2015</a:t>
             </a:fld>
             <a:endParaRPr lang="de-DE"/>
           </a:p>
@@ -4207,7 +4215,7 @@
             </a:r>
             <a:r>
               <a:rPr lang="de-CH" dirty="0" err="1" smtClean="0"/>
-              <a:t>with</a:t>
+              <a:t>within</a:t>
             </a:r>
             <a:r>
               <a:rPr lang="de-CH" dirty="0" smtClean="0"/>
@@ -4219,11 +4227,22 @@
             </a:r>
             <a:r>
               <a:rPr lang="de-CH" dirty="0" smtClean="0"/>
-              <a:t> time </a:t>
-            </a:r>
+              <a:t> time</a:t>
+            </a:r>
+          </a:p>
+          <a:p>
+            <a:pPr lvl="1"/>
             <a:r>
               <a:rPr lang="de-CH" dirty="0" err="1" smtClean="0"/>
-              <a:t>between</a:t>
+              <a:t>Then</a:t>
+            </a:r>
+            <a:r>
+              <a:rPr lang="de-CH" dirty="0" smtClean="0"/>
+              <a:t>, </a:t>
+            </a:r>
+            <a:r>
+              <a:rPr lang="de-CH" dirty="0" err="1" smtClean="0"/>
+              <a:t>momentum</a:t>
             </a:r>
             <a:r>
               <a:rPr lang="de-CH" dirty="0" smtClean="0"/>
@@ -4231,27 +4250,7 @@
             </a:r>
             <a:r>
               <a:rPr lang="de-CH" dirty="0" err="1" smtClean="0"/>
-              <a:t>collisions</a:t>
-            </a:r>
-            <a:endParaRPr lang="de-CH" dirty="0" smtClean="0"/>
-          </a:p>
-          <a:p>
-            <a:pPr lvl="1"/>
-            <a:r>
-              <a:rPr lang="de-CH" dirty="0" smtClean="0"/>
-              <a:t>After </a:t>
-            </a:r>
-            <a:r>
-              <a:rPr lang="de-CH" dirty="0" err="1" smtClean="0"/>
-              <a:t>collision</a:t>
-            </a:r>
-            <a:r>
-              <a:rPr lang="de-CH" dirty="0" smtClean="0"/>
-              <a:t>, </a:t>
-            </a:r>
-            <a:r>
-              <a:rPr lang="de-CH" dirty="0" err="1" smtClean="0"/>
-              <a:t>momentum</a:t>
+              <a:t>is</a:t>
             </a:r>
             <a:r>
               <a:rPr lang="de-CH" dirty="0" smtClean="0"/>
@@ -4259,7 +4258,7 @@
             </a:r>
             <a:r>
               <a:rPr lang="de-CH" dirty="0" err="1" smtClean="0"/>
-              <a:t>is</a:t>
+              <a:t>chosen</a:t>
             </a:r>
             <a:r>
               <a:rPr lang="de-CH" dirty="0" smtClean="0"/>
@@ -4267,7 +4266,7 @@
             </a:r>
             <a:r>
               <a:rPr lang="de-CH" dirty="0" err="1" smtClean="0"/>
-              <a:t>chosen</a:t>
+              <a:t>randomly</a:t>
             </a:r>
             <a:r>
               <a:rPr lang="de-CH" dirty="0" smtClean="0"/>
@@ -4275,7 +4274,7 @@
             </a:r>
             <a:r>
               <a:rPr lang="de-CH" dirty="0" err="1" smtClean="0"/>
-              <a:t>randomly</a:t>
+              <a:t>from</a:t>
             </a:r>
             <a:r>
               <a:rPr lang="de-CH" dirty="0" smtClean="0"/>
@@ -4283,7 +4282,7 @@
             </a:r>
             <a:r>
               <a:rPr lang="de-CH" dirty="0" err="1" smtClean="0"/>
-              <a:t>from</a:t>
+              <a:t>Maxwellian</a:t>
             </a:r>
             <a:r>
               <a:rPr lang="de-CH" dirty="0" smtClean="0"/>
@@ -4291,7 +4290,14 @@
             </a:r>
             <a:r>
               <a:rPr lang="de-CH" dirty="0" err="1" smtClean="0"/>
-              <a:t>Maxwellian</a:t>
+              <a:t>distribution</a:t>
+            </a:r>
+            <a:endParaRPr lang="de-CH" dirty="0" smtClean="0"/>
+          </a:p>
+          <a:p>
+            <a:r>
+              <a:rPr lang="de-CH" dirty="0" err="1" smtClean="0"/>
+              <a:t>Stochastic</a:t>
             </a:r>
             <a:r>
               <a:rPr lang="de-CH" dirty="0" smtClean="0"/>
@@ -4299,14 +4305,7 @@
             </a:r>
             <a:r>
               <a:rPr lang="de-CH" dirty="0" err="1" smtClean="0"/>
-              <a:t>distribution</a:t>
-            </a:r>
-            <a:endParaRPr lang="de-CH" dirty="0" smtClean="0"/>
-          </a:p>
-          <a:p>
-            <a:r>
-              <a:rPr lang="de-CH" dirty="0" err="1" smtClean="0"/>
-              <a:t>Stochastic</a:t>
+              <a:t>coupling</a:t>
             </a:r>
             <a:r>
               <a:rPr lang="de-CH" dirty="0" smtClean="0"/>
@@ -4314,7 +4313,7 @@
             </a:r>
             <a:r>
               <a:rPr lang="de-CH" dirty="0" err="1" smtClean="0"/>
-              <a:t>coupling</a:t>
+              <a:t>to</a:t>
             </a:r>
             <a:r>
               <a:rPr lang="de-CH" dirty="0" smtClean="0"/>
@@ -4322,7 +4321,7 @@
             </a:r>
             <a:r>
               <a:rPr lang="de-CH" dirty="0" err="1" smtClean="0"/>
-              <a:t>to</a:t>
+              <a:t>heat</a:t>
             </a:r>
             <a:r>
               <a:rPr lang="de-CH" dirty="0" smtClean="0"/>
@@ -4330,7 +4329,15 @@
             </a:r>
             <a:r>
               <a:rPr lang="de-CH" dirty="0" err="1" smtClean="0"/>
-              <a:t>heat</a:t>
+              <a:t>bath</a:t>
+            </a:r>
+            <a:endParaRPr lang="de-CH" dirty="0" smtClean="0"/>
+          </a:p>
+          <a:p>
+            <a:pPr lvl="1"/>
+            <a:r>
+              <a:rPr lang="de-CH" dirty="0" err="1" smtClean="0"/>
+              <a:t>Langevin</a:t>
             </a:r>
             <a:r>
               <a:rPr lang="de-CH" dirty="0" smtClean="0"/>
@@ -4338,15 +4345,29 @@
             </a:r>
             <a:r>
               <a:rPr lang="de-CH" dirty="0" err="1" smtClean="0"/>
-              <a:t>bath</a:t>
-            </a:r>
+              <a:t>equation</a:t>
+            </a:r>
+            <a:r>
+              <a:rPr lang="de-CH" dirty="0" smtClean="0"/>
+              <a:t>:</a:t>
+            </a:r>
+          </a:p>
+          <a:p>
+            <a:pPr lvl="1"/>
             <a:endParaRPr lang="de-CH" dirty="0" smtClean="0"/>
           </a:p>
           <a:p>
             <a:pPr lvl="1"/>
+            <a:endParaRPr lang="de-CH" dirty="0" smtClean="0"/>
+          </a:p>
+          <a:p>
+            <a:pPr lvl="1"/>
+            <a:endParaRPr lang="de-CH" dirty="0" smtClean="0"/>
+          </a:p>
+          <a:p>
             <a:r>
               <a:rPr lang="de-CH" dirty="0" err="1" smtClean="0"/>
-              <a:t>Langevin</a:t>
+              <a:t>Weak</a:t>
             </a:r>
             <a:r>
               <a:rPr lang="de-CH" dirty="0" smtClean="0"/>
@@ -4354,29 +4375,7 @@
             </a:r>
             <a:r>
               <a:rPr lang="de-CH" dirty="0" err="1" smtClean="0"/>
-              <a:t>equation</a:t>
-            </a:r>
-            <a:r>
-              <a:rPr lang="de-CH" dirty="0" smtClean="0"/>
-              <a:t>:</a:t>
-            </a:r>
-          </a:p>
-          <a:p>
-            <a:pPr lvl="1"/>
-            <a:endParaRPr lang="de-CH" dirty="0" smtClean="0"/>
-          </a:p>
-          <a:p>
-            <a:pPr lvl="1"/>
-            <a:endParaRPr lang="de-CH" dirty="0" smtClean="0"/>
-          </a:p>
-          <a:p>
-            <a:pPr lvl="1"/>
-            <a:endParaRPr lang="de-CH" dirty="0" smtClean="0"/>
-          </a:p>
-          <a:p>
-            <a:r>
-              <a:rPr lang="de-CH" dirty="0" err="1" smtClean="0"/>
-              <a:t>Weak</a:t>
+              <a:t>coupling</a:t>
             </a:r>
             <a:r>
               <a:rPr lang="de-CH" dirty="0" smtClean="0"/>
@@ -4384,7 +4383,7 @@
             </a:r>
             <a:r>
               <a:rPr lang="de-CH" dirty="0" err="1" smtClean="0"/>
-              <a:t>coupling</a:t>
+              <a:t>to</a:t>
             </a:r>
             <a:r>
               <a:rPr lang="de-CH" dirty="0" smtClean="0"/>
@@ -4392,7 +4391,7 @@
             </a:r>
             <a:r>
               <a:rPr lang="de-CH" dirty="0" err="1" smtClean="0"/>
-              <a:t>to</a:t>
+              <a:t>external</a:t>
             </a:r>
             <a:r>
               <a:rPr lang="de-CH" dirty="0" smtClean="0"/>
@@ -4400,7 +4399,7 @@
             </a:r>
             <a:r>
               <a:rPr lang="de-CH" dirty="0" err="1" smtClean="0"/>
-              <a:t>external</a:t>
+              <a:t>pressure</a:t>
             </a:r>
             <a:r>
               <a:rPr lang="de-CH" dirty="0" smtClean="0"/>
@@ -4408,14 +4407,6 @@
             </a:r>
             <a:r>
               <a:rPr lang="de-CH" dirty="0" err="1" smtClean="0"/>
-              <a:t>pressure</a:t>
-            </a:r>
-            <a:r>
-              <a:rPr lang="de-CH" dirty="0" smtClean="0"/>
-              <a:t> </a:t>
-            </a:r>
-            <a:r>
-              <a:rPr lang="de-CH" dirty="0" err="1" smtClean="0"/>
               <a:t>bath</a:t>
             </a:r>
             <a:endParaRPr lang="de-CH" dirty="0"/>
@@ -4439,7 +4430,7 @@
           <a:p>
             <a:fld id="{3B2F6CB8-9391-4BED-909F-C47A979AE1C4}" type="datetime1">
               <a:rPr lang="de-DE" smtClean="0"/>
-              <a:t>25.05.2015</a:t>
+              <a:t>26.05.2015</a:t>
             </a:fld>
             <a:endParaRPr lang="de-DE"/>
           </a:p>
@@ -4500,20 +4491,20 @@
           <p:nvPr>
             <p:extLst>
               <p:ext uri="{D42A27DB-BD31-4B8C-83A1-F6EECF244321}">
-                <p14:modId xmlns:p14="http://schemas.microsoft.com/office/powerpoint/2010/main" val="3205670370"/>
+                <p14:modId xmlns:p14="http://schemas.microsoft.com/office/powerpoint/2010/main" val="2849049600"/>
               </p:ext>
             </p:extLst>
           </p:nvPr>
         </p:nvGraphicFramePr>
         <p:xfrm>
-          <a:off x="1048622" y="3975123"/>
+          <a:off x="1048622" y="3689897"/>
           <a:ext cx="5211951" cy="910023"/>
         </p:xfrm>
         <a:graphic>
           <a:graphicData uri="http://schemas.openxmlformats.org/presentationml/2006/ole">
             <mc:AlternateContent xmlns:mc="http://schemas.openxmlformats.org/markup-compatibility/2006">
               <mc:Choice xmlns:v="urn:schemas-microsoft-com:vml" Requires="v">
-                <p:oleObj spid="_x0000_s9221" name="Equation" r:id="rId3" imgW="2400120" imgH="419040" progId="Equation.DSMT4">
+                <p:oleObj spid="_x0000_s9227" name="Equation" r:id="rId3" imgW="2400120" imgH="419040" progId="Equation.DSMT4">
                   <p:embed/>
                 </p:oleObj>
               </mc:Choice>
@@ -4534,7 +4525,7 @@
                     </p:blipFill>
                     <p:spPr>
                       <a:xfrm>
-                        <a:off x="1048622" y="3975123"/>
+                        <a:off x="1048622" y="3689897"/>
                         <a:ext cx="5211951" cy="910023"/>
                       </a:xfrm>
                       <a:prstGeom prst="rect">
@@ -4557,20 +4548,20 @@
           <p:nvPr>
             <p:extLst>
               <p:ext uri="{D42A27DB-BD31-4B8C-83A1-F6EECF244321}">
-                <p14:modId xmlns:p14="http://schemas.microsoft.com/office/powerpoint/2010/main" val="2031747882"/>
+                <p14:modId xmlns:p14="http://schemas.microsoft.com/office/powerpoint/2010/main" val="2101649981"/>
               </p:ext>
             </p:extLst>
           </p:nvPr>
         </p:nvGraphicFramePr>
         <p:xfrm>
-          <a:off x="872454" y="5378399"/>
-          <a:ext cx="4289158" cy="1398639"/>
+          <a:off x="1048622" y="5220956"/>
+          <a:ext cx="4001548" cy="1304853"/>
         </p:xfrm>
         <a:graphic>
           <a:graphicData uri="http://schemas.openxmlformats.org/presentationml/2006/ole">
             <mc:AlternateContent xmlns:mc="http://schemas.openxmlformats.org/markup-compatibility/2006">
               <mc:Choice xmlns:v="urn:schemas-microsoft-com:vml" Requires="v">
-                <p:oleObj spid="_x0000_s9222" name="Equation" r:id="rId5" imgW="1752480" imgH="571320" progId="Equation.DSMT4">
+                <p:oleObj spid="_x0000_s9228" name="Equation" r:id="rId5" imgW="1752480" imgH="571320" progId="Equation.DSMT4">
                   <p:embed/>
                 </p:oleObj>
               </mc:Choice>
@@ -4591,8 +4582,8 @@
                     </p:blipFill>
                     <p:spPr>
                       <a:xfrm>
-                        <a:off x="872454" y="5378399"/>
-                        <a:ext cx="4289158" cy="1398639"/>
+                        <a:off x="1048622" y="5220956"/>
+                        <a:ext cx="4001548" cy="1304853"/>
                       </a:xfrm>
                       <a:prstGeom prst="rect">
                         <a:avLst/>
@@ -4645,14 +4636,42 @@
           <a:chExt cx="0" cy="0"/>
         </a:xfrm>
       </p:grpSpPr>
-      <p:sp>
-        <p:nvSpPr>
-          <p:cNvPr id="2" name="Inhaltsplatzhalter 1"/>
-          <p:cNvSpPr>
-            <a:spLocks noGrp="1"/>
-          </p:cNvSpPr>
+      <p:pic>
+        <p:nvPicPr>
+          <p:cNvPr id="4" name="Inhaltsplatzhalter 3" descr="plot_3000a_1k.pdf - Adobe Reader"/>
+          <p:cNvPicPr>
+            <a:picLocks noGrp="1" noChangeAspect="1"/>
+          </p:cNvPicPr>
           <p:nvPr>
             <p:ph idx="1"/>
+          </p:nvPr>
+        </p:nvPicPr>
+        <p:blipFill rotWithShape="1">
+          <a:blip r:embed="rId2" cstate="print">
+            <a:extLst>
+              <a:ext uri="{28A0092B-C50C-407E-A947-70E740481C1C}">
+                <a14:useLocalDpi xmlns:a14="http://schemas.microsoft.com/office/drawing/2010/main" val="0"/>
+              </a:ext>
+            </a:extLst>
+          </a:blip>
+          <a:srcRect l="16988" t="11415" r="16945" b="2498"/>
+          <a:stretch/>
+        </p:blipFill>
+        <p:spPr>
+          <a:xfrm>
+            <a:off x="1661019" y="1091633"/>
+            <a:ext cx="5578680" cy="5534404"/>
+          </a:xfrm>
+        </p:spPr>
+      </p:pic>
+      <p:sp>
+        <p:nvSpPr>
+          <p:cNvPr id="3" name="Datumsplatzhalter 2"/>
+          <p:cNvSpPr>
+            <a:spLocks noGrp="1"/>
+          </p:cNvSpPr>
+          <p:nvPr>
+            <p:ph type="dt" sz="half" idx="10"/>
           </p:nvPr>
         </p:nvSpPr>
         <p:spPr/>
@@ -4660,28 +4679,9 @@
           <a:bodyPr/>
           <a:lstStyle/>
           <a:p>
-            <a:endParaRPr lang="de-CH" dirty="0"/>
-          </a:p>
-        </p:txBody>
-      </p:sp>
-      <p:sp>
-        <p:nvSpPr>
-          <p:cNvPr id="3" name="Datumsplatzhalter 2"/>
-          <p:cNvSpPr>
-            <a:spLocks noGrp="1"/>
-          </p:cNvSpPr>
-          <p:nvPr>
-            <p:ph type="dt" sz="half" idx="10"/>
-          </p:nvPr>
-        </p:nvSpPr>
-        <p:spPr/>
-        <p:txBody>
-          <a:bodyPr/>
-          <a:lstStyle/>
-          <a:p>
             <a:fld id="{3B2F6CB8-9391-4BED-909F-C47A979AE1C4}" type="datetime1">
               <a:rPr lang="de-DE" smtClean="0"/>
-              <a:t>25.05.2015</a:t>
+              <a:t>26.05.2015</a:t>
             </a:fld>
             <a:endParaRPr lang="de-DE"/>
           </a:p>
@@ -4720,7 +4720,9 @@
             <p:ph type="title"/>
           </p:nvPr>
         </p:nvSpPr>
-        <p:spPr/>
+        <p:spPr>
+          <a:noFill/>
+        </p:spPr>
         <p:txBody>
           <a:bodyPr/>
           <a:lstStyle/>

</xml_diff>